<commit_message>
fix typo in nested notes
</commit_message>
<xml_diff>
--- a/multiWayANOVA/13a_multiwayAnovaDarren.pptx
+++ b/multiWayANOVA/13a_multiwayAnovaDarren.pptx
@@ -5872,7 +5872,7 @@
           <a:p>
             <a:r>
               <a:rPr lang="en-US" dirty="0" smtClean="0"/>
-              <a:t>If factor </a:t>
+              <a:t>A factor </a:t>
             </a:r>
             <a:r>
               <a:rPr lang="en-US" dirty="0" smtClean="0"/>
@@ -5892,7 +5892,7 @@
             </a:r>
             <a:r>
               <a:rPr lang="en-US" dirty="0" smtClean="0"/>
-              <a:t>in a factor A if every level of B occurs within exactly one level of A</a:t>
+              <a:t>in a factor A if each level of B occurs in only one level of A</a:t>
             </a:r>
             <a:endParaRPr lang="en-US" dirty="0" smtClean="0"/>
           </a:p>
@@ -5993,7 +5993,7 @@
         </p:nvSpPr>
         <p:spPr>
           <a:xfrm>
-            <a:off x="822959" y="1693334"/>
+            <a:off x="822959" y="1676400"/>
             <a:ext cx="7543801" cy="4631266"/>
           </a:xfrm>
         </p:spPr>
@@ -6008,11 +6008,11 @@
               <a:t>“</a:t>
             </a:r>
             <a:r>
-              <a:rPr lang="en-US" sz="1900" dirty="0"/>
-              <a:t>If factor B is </a:t>
-            </a:r>
-            <a:r>
-              <a:rPr lang="en-US" sz="1900" b="1" u="sng" cap="small" dirty="0">
+              <a:rPr lang="en-US" sz="1800" dirty="0"/>
+              <a:t>A factor B is </a:t>
+            </a:r>
+            <a:r>
+              <a:rPr lang="en-US" sz="1800" b="1" u="sng" cap="small" dirty="0">
                 <a:solidFill>
                   <a:srgbClr val="FF0000"/>
                 </a:solidFill>
@@ -6020,28 +6020,16 @@
               <a:t>nested</a:t>
             </a:r>
             <a:r>
-              <a:rPr lang="en-US" sz="1900" dirty="0"/>
-              <a:t> in a factor A if </a:t>
+              <a:rPr lang="en-US" sz="1800" dirty="0"/>
+              <a:t> in a factor A if each level of B occurs in only one level of </a:t>
+            </a:r>
+            <a:r>
+              <a:rPr lang="en-US" sz="1800" dirty="0" smtClean="0"/>
+              <a:t>A</a:t>
             </a:r>
             <a:r>
               <a:rPr lang="en-US" sz="1900" dirty="0" smtClean="0"/>
-              <a:t>each </a:t>
-            </a:r>
-            <a:r>
-              <a:rPr lang="en-US" sz="1900" dirty="0"/>
-              <a:t>level of B occurs within </a:t>
-            </a:r>
-            <a:r>
-              <a:rPr lang="en-US" sz="1900" dirty="0" smtClean="0"/>
-              <a:t>only </a:t>
-            </a:r>
-            <a:r>
-              <a:rPr lang="en-US" sz="1900" dirty="0"/>
-              <a:t>one level of </a:t>
-            </a:r>
-            <a:r>
-              <a:rPr lang="en-US" sz="1900" dirty="0" smtClean="0"/>
-              <a:t>A”</a:t>
+              <a:t>”</a:t>
             </a:r>
             <a:endParaRPr lang="en-US" sz="1900" b="1" dirty="0" smtClean="0"/>
           </a:p>
@@ -6076,11 +6064,19 @@
           <a:p>
             <a:r>
               <a:rPr lang="en-US" sz="1900" dirty="0"/>
-              <a:t>In this case the treatment is nested in gender</a:t>
+              <a:t>In this case the treatment is nested in </a:t>
             </a:r>
             <a:r>
               <a:rPr lang="en-US" sz="1900" dirty="0" smtClean="0"/>
-              <a:t>.</a:t>
+              <a:t>gender</a:t>
+            </a:r>
+            <a:r>
+              <a:rPr lang="en-US" sz="1900" dirty="0"/>
+              <a:t> </a:t>
+            </a:r>
+            <a:r>
+              <a:rPr lang="en-US" sz="1900" dirty="0" smtClean="0"/>
+              <a:t>(in this case, gender is also nested in treatment, though it is more sensible the other way)</a:t>
             </a:r>
             <a:endParaRPr lang="en-US" sz="1900" b="1" dirty="0" smtClean="0"/>
           </a:p>

</xml_diff>